<commit_message>
All done without xml names
</commit_message>
<xml_diff>
--- a/Prezentare.pptx
+++ b/Prezentare.pptx
@@ -14,9 +14,11 @@
     <p:sldId id="263" r:id="rId8"/>
     <p:sldId id="264" r:id="rId9"/>
     <p:sldId id="265" r:id="rId10"/>
-    <p:sldId id="266" r:id="rId11"/>
-    <p:sldId id="268" r:id="rId12"/>
-    <p:sldId id="267" r:id="rId13"/>
+    <p:sldId id="270" r:id="rId11"/>
+    <p:sldId id="266" r:id="rId12"/>
+    <p:sldId id="268" r:id="rId13"/>
+    <p:sldId id="267" r:id="rId14"/>
+    <p:sldId id="271" r:id="rId15"/>
   </p:sldIdLst>
   <p:sldSz cx="9144000" cy="6858000" type="screen4x3"/>
   <p:notesSz cx="6858000" cy="9144000"/>
@@ -253,7 +255,7 @@
             <a:fld id="{C9F9983C-C51B-4829-9691-2C8D221CB1D2}" type="datetimeFigureOut">
               <a:rPr lang="en-US" smtClean="0"/>
               <a:pPr/>
-              <a:t>5/18/2016</a:t>
+              <a:t>5/7/2017</a:t>
             </a:fld>
             <a:endParaRPr lang="en-US"/>
           </a:p>
@@ -568,7 +570,7 @@
             <a:fld id="{C9F9983C-C51B-4829-9691-2C8D221CB1D2}" type="datetimeFigureOut">
               <a:rPr lang="en-US" smtClean="0"/>
               <a:pPr/>
-              <a:t>5/18/2016</a:t>
+              <a:t>5/7/2017</a:t>
             </a:fld>
             <a:endParaRPr lang="en-US"/>
           </a:p>
@@ -755,7 +757,7 @@
             <a:fld id="{C9F9983C-C51B-4829-9691-2C8D221CB1D2}" type="datetimeFigureOut">
               <a:rPr lang="en-US" smtClean="0"/>
               <a:pPr/>
-              <a:t>5/18/2016</a:t>
+              <a:t>5/7/2017</a:t>
             </a:fld>
             <a:endParaRPr lang="en-US"/>
           </a:p>
@@ -932,7 +934,7 @@
             <a:fld id="{C9F9983C-C51B-4829-9691-2C8D221CB1D2}" type="datetimeFigureOut">
               <a:rPr lang="en-US" smtClean="0"/>
               <a:pPr/>
-              <a:t>5/18/2016</a:t>
+              <a:t>5/7/2017</a:t>
             </a:fld>
             <a:endParaRPr lang="en-US"/>
           </a:p>
@@ -1202,7 +1204,7 @@
             <a:fld id="{C9F9983C-C51B-4829-9691-2C8D221CB1D2}" type="datetimeFigureOut">
               <a:rPr lang="en-US" smtClean="0"/>
               <a:pPr/>
-              <a:t>5/18/2016</a:t>
+              <a:t>5/7/2017</a:t>
             </a:fld>
             <a:endParaRPr lang="en-US"/>
           </a:p>
@@ -1672,7 +1674,7 @@
             <a:fld id="{C9F9983C-C51B-4829-9691-2C8D221CB1D2}" type="datetimeFigureOut">
               <a:rPr lang="en-US" smtClean="0"/>
               <a:pPr/>
-              <a:t>5/18/2016</a:t>
+              <a:t>5/7/2017</a:t>
             </a:fld>
             <a:endParaRPr lang="en-US"/>
           </a:p>
@@ -2163,7 +2165,7 @@
             <a:fld id="{C9F9983C-C51B-4829-9691-2C8D221CB1D2}" type="datetimeFigureOut">
               <a:rPr lang="en-US" smtClean="0"/>
               <a:pPr/>
-              <a:t>5/18/2016</a:t>
+              <a:t>5/7/2017</a:t>
             </a:fld>
             <a:endParaRPr lang="en-US"/>
           </a:p>
@@ -2291,7 +2293,7 @@
             <a:fld id="{C9F9983C-C51B-4829-9691-2C8D221CB1D2}" type="datetimeFigureOut">
               <a:rPr lang="en-US" smtClean="0"/>
               <a:pPr/>
-              <a:t>5/18/2016</a:t>
+              <a:t>5/7/2017</a:t>
             </a:fld>
             <a:endParaRPr lang="en-US"/>
           </a:p>
@@ -2437,7 +2439,7 @@
             <a:fld id="{C9F9983C-C51B-4829-9691-2C8D221CB1D2}" type="datetimeFigureOut">
               <a:rPr lang="en-US" smtClean="0"/>
               <a:pPr/>
-              <a:t>5/18/2016</a:t>
+              <a:t>5/7/2017</a:t>
             </a:fld>
             <a:endParaRPr lang="en-US"/>
           </a:p>
@@ -2761,7 +2763,7 @@
             <a:fld id="{C9F9983C-C51B-4829-9691-2C8D221CB1D2}" type="datetimeFigureOut">
               <a:rPr lang="en-US" smtClean="0"/>
               <a:pPr/>
-              <a:t>5/18/2016</a:t>
+              <a:t>5/7/2017</a:t>
             </a:fld>
             <a:endParaRPr lang="en-US"/>
           </a:p>
@@ -2897,7 +2899,7 @@
             <a:fld id="{C9F9983C-C51B-4829-9691-2C8D221CB1D2}" type="datetimeFigureOut">
               <a:rPr lang="en-US" smtClean="0"/>
               <a:pPr/>
-              <a:t>5/18/2016</a:t>
+              <a:t>5/7/2017</a:t>
             </a:fld>
             <a:endParaRPr lang="en-US"/>
           </a:p>
@@ -3680,7 +3682,7 @@
             <a:fld id="{C9F9983C-C51B-4829-9691-2C8D221CB1D2}" type="datetimeFigureOut">
               <a:rPr lang="en-US" smtClean="0"/>
               <a:pPr/>
-              <a:t>5/18/2016</a:t>
+              <a:t>5/7/2017</a:t>
             </a:fld>
             <a:endParaRPr lang="en-US"/>
           </a:p>
@@ -4198,8 +4200,12 @@
           <a:lstStyle/>
           <a:p>
             <a:r>
+              <a:rPr lang="en-US" dirty="0" smtClean="0"/>
+              <a:t>Firma </a:t>
+            </a:r>
+            <a:r>
               <a:rPr lang="en-US" dirty="0" err="1" smtClean="0"/>
-              <a:t>Rezervare</a:t>
+              <a:t>prestare</a:t>
             </a:r>
             <a:r>
               <a:rPr lang="en-US" dirty="0" smtClean="0"/>
@@ -4207,11 +4213,15 @@
             </a:r>
             <a:r>
               <a:rPr lang="en-US" dirty="0" err="1" smtClean="0"/>
-              <a:t>bilete</a:t>
+              <a:t>servicii</a:t>
             </a:r>
             <a:r>
               <a:rPr lang="en-US" dirty="0" smtClean="0"/>
-              <a:t> la film</a:t>
+              <a:t> la </a:t>
+            </a:r>
+            <a:r>
+              <a:rPr lang="en-US" dirty="0" err="1" smtClean="0"/>
+              <a:t>domiciliu</a:t>
             </a:r>
             <a:endParaRPr lang="en-US" dirty="0"/>
           </a:p>
@@ -4248,15 +4258,11 @@
             <a:pPr algn="r"/>
             <a:r>
               <a:rPr lang="en-US" dirty="0" err="1" smtClean="0"/>
-              <a:t>Tugurin</a:t>
+              <a:t>Surdu</a:t>
             </a:r>
             <a:r>
               <a:rPr lang="en-US" dirty="0" smtClean="0"/>
-              <a:t> </a:t>
-            </a:r>
-            <a:r>
-              <a:rPr lang="en-US" dirty="0" err="1" smtClean="0"/>
-              <a:t>Iuliana</a:t>
+              <a:t> Marian</a:t>
             </a:r>
             <a:endParaRPr lang="en-US" dirty="0" smtClean="0"/>
           </a:p>
@@ -4264,7 +4270,7 @@
             <a:pPr algn="r"/>
             <a:r>
               <a:rPr lang="en-US" dirty="0" smtClean="0"/>
-              <a:t>342 A3</a:t>
+              <a:t>3423A3</a:t>
             </a:r>
             <a:endParaRPr lang="en-US" dirty="0"/>
           </a:p>
@@ -4310,28 +4316,34 @@
             <a:spLocks noGrp="1"/>
           </p:cNvSpPr>
           <p:nvPr>
-            <p:ph type="title"/>
+            <p:ph type="ctrTitle"/>
           </p:nvPr>
         </p:nvSpPr>
         <p:spPr>
           <a:xfrm>
-            <a:off x="1447800" y="304800"/>
-            <a:ext cx="7498080" cy="1143000"/>
+            <a:off x="1219200" y="-304800"/>
+            <a:ext cx="7406640" cy="1472184"/>
           </a:xfrm>
         </p:spPr>
         <p:txBody>
-          <a:bodyPr>
-            <a:normAutofit fontScale="90000"/>
-          </a:bodyPr>
+          <a:bodyPr/>
           <a:lstStyle/>
           <a:p>
             <a:r>
-              <a:rPr lang="en-US" dirty="0" smtClean="0"/>
-              <a:t>6. </a:t>
+              <a:rPr lang="en-US" dirty="0"/>
+              <a:t>5.3. </a:t>
+            </a:r>
+            <a:r>
+              <a:rPr lang="en-US" dirty="0" err="1"/>
+              <a:t>Aplicatie</a:t>
+            </a:r>
+            <a:r>
+              <a:rPr lang="en-US" dirty="0"/>
+              <a:t> – </a:t>
             </a:r>
             <a:r>
               <a:rPr lang="en-US" dirty="0" err="1" smtClean="0"/>
-              <a:t>Limbaje</a:t>
+              <a:t>Vizualizare</a:t>
             </a:r>
             <a:r>
               <a:rPr lang="en-US" dirty="0" smtClean="0"/>
@@ -4339,234 +4351,93 @@
             </a:r>
             <a:r>
               <a:rPr lang="en-US" dirty="0" err="1" smtClean="0"/>
-              <a:t>si</a:t>
-            </a:r>
-            <a:r>
-              <a:rPr lang="en-US" dirty="0" smtClean="0"/>
-              <a:t> </a:t>
-            </a:r>
-            <a:r>
-              <a:rPr lang="en-US" smtClean="0"/>
-              <a:t>clase </a:t>
-            </a:r>
-            <a:r>
-              <a:rPr lang="en-US" dirty="0" err="1" smtClean="0"/>
-              <a:t>folosite</a:t>
-            </a:r>
-            <a:r>
-              <a:rPr lang="en-US" dirty="0" smtClean="0"/>
-              <a:t> </a:t>
-            </a:r>
-            <a:r>
-              <a:rPr lang="en-US" dirty="0" err="1" smtClean="0"/>
-              <a:t>pentru</a:t>
-            </a:r>
-            <a:r>
-              <a:rPr lang="en-US" dirty="0" smtClean="0"/>
-              <a:t> </a:t>
-            </a:r>
-            <a:r>
-              <a:rPr lang="en-US" dirty="0" err="1" smtClean="0"/>
-              <a:t>aplicatie</a:t>
+              <a:t>raport</a:t>
             </a:r>
             <a:endParaRPr lang="en-US" dirty="0"/>
           </a:p>
         </p:txBody>
       </p:sp>
-      <p:sp>
-        <p:nvSpPr>
-          <p:cNvPr id="3" name="Content Placeholder 2"/>
-          <p:cNvSpPr>
-            <a:spLocks noGrp="1"/>
-          </p:cNvSpPr>
-          <p:nvPr>
-            <p:ph idx="1"/>
-          </p:nvPr>
-        </p:nvSpPr>
-        <p:spPr/>
-        <p:txBody>
-          <a:bodyPr/>
-          <a:lstStyle/>
-          <a:p>
-            <a:r>
-              <a:rPr lang="en-US" dirty="0" err="1" smtClean="0"/>
-              <a:t>Aplicatia</a:t>
-            </a:r>
-            <a:r>
-              <a:rPr lang="en-US" dirty="0" smtClean="0"/>
-              <a:t> a </a:t>
-            </a:r>
-            <a:r>
-              <a:rPr lang="en-US" dirty="0" err="1" smtClean="0"/>
-              <a:t>fost</a:t>
-            </a:r>
-            <a:r>
-              <a:rPr lang="en-US" dirty="0" smtClean="0"/>
-              <a:t> </a:t>
-            </a:r>
-            <a:r>
-              <a:rPr lang="en-US" dirty="0" err="1" smtClean="0"/>
-              <a:t>realizata</a:t>
-            </a:r>
-            <a:r>
-              <a:rPr lang="en-US" dirty="0" smtClean="0"/>
-              <a:t> in Visual Studio 2015 ca </a:t>
-            </a:r>
-            <a:r>
-              <a:rPr lang="en-US" dirty="0" err="1" smtClean="0"/>
-              <a:t>proiect</a:t>
-            </a:r>
-            <a:r>
-              <a:rPr lang="en-US" dirty="0" smtClean="0"/>
-              <a:t> de tip </a:t>
-            </a:r>
-            <a:r>
-              <a:rPr lang="en-US" dirty="0" err="1" smtClean="0"/>
-              <a:t>WebForm</a:t>
-            </a:r>
-            <a:endParaRPr lang="en-US" dirty="0" smtClean="0"/>
-          </a:p>
-          <a:p>
-            <a:r>
-              <a:rPr lang="en-US" dirty="0" err="1" smtClean="0"/>
-              <a:t>Limbaje</a:t>
-            </a:r>
-            <a:r>
-              <a:rPr lang="en-US" smtClean="0"/>
-              <a:t>: C#, HTML, CSS</a:t>
-            </a:r>
-            <a:endParaRPr lang="en-US" dirty="0" smtClean="0"/>
-          </a:p>
-          <a:p>
-            <a:r>
-              <a:rPr lang="en-US" dirty="0" err="1" smtClean="0"/>
-              <a:t>Pentru</a:t>
-            </a:r>
-            <a:r>
-              <a:rPr lang="en-US" dirty="0" smtClean="0"/>
-              <a:t> </a:t>
-            </a:r>
-            <a:r>
-              <a:rPr lang="en-US" dirty="0" err="1" smtClean="0"/>
-              <a:t>parsarea</a:t>
-            </a:r>
-            <a:r>
-              <a:rPr lang="en-US" dirty="0" smtClean="0"/>
-              <a:t> </a:t>
-            </a:r>
-            <a:r>
-              <a:rPr lang="en-US" dirty="0" err="1" smtClean="0"/>
-              <a:t>documentului</a:t>
-            </a:r>
-            <a:r>
-              <a:rPr lang="en-US" dirty="0" smtClean="0"/>
-              <a:t> am </a:t>
-            </a:r>
-            <a:r>
-              <a:rPr lang="en-US" dirty="0" err="1" smtClean="0"/>
-              <a:t>folosit</a:t>
-            </a:r>
-            <a:r>
-              <a:rPr lang="en-US" dirty="0" smtClean="0"/>
-              <a:t> </a:t>
-            </a:r>
-            <a:r>
-              <a:rPr lang="en-US" dirty="0" err="1" smtClean="0"/>
-              <a:t>clasa</a:t>
-            </a:r>
-            <a:r>
-              <a:rPr lang="en-US" dirty="0" smtClean="0"/>
-              <a:t> </a:t>
-            </a:r>
-            <a:r>
-              <a:rPr lang="en-US" dirty="0" err="1" smtClean="0">
+      <p:pic>
+        <p:nvPicPr>
+          <p:cNvPr id="8194" name="Picture 2"/>
+          <p:cNvPicPr>
+            <a:picLocks noChangeAspect="1" noChangeArrowheads="1"/>
+          </p:cNvPicPr>
+          <p:nvPr/>
+        </p:nvPicPr>
+        <p:blipFill>
+          <a:blip r:embed="rId2">
+            <a:extLst>
+              <a:ext uri="{28A0092B-C50C-407E-A947-70E740481C1C}">
+                <a14:useLocalDpi xmlns:a14="http://schemas.microsoft.com/office/drawing/2010/main" val="0"/>
+              </a:ext>
+            </a:extLst>
+          </a:blip>
+          <a:srcRect/>
+          <a:stretch>
+            <a:fillRect/>
+          </a:stretch>
+        </p:blipFill>
+        <p:spPr bwMode="auto">
+          <a:xfrm>
+            <a:off x="1295400" y="1311442"/>
+            <a:ext cx="7751967" cy="4805363"/>
+          </a:xfrm>
+          <a:prstGeom prst="rect">
+            <a:avLst/>
+          </a:prstGeom>
+          <a:noFill/>
+          <a:ln>
+            <a:noFill/>
+          </a:ln>
+          <a:effectLst/>
+          <a:extLst>
+            <a:ext uri="{909E8E84-426E-40DD-AFC4-6F175D3DCCD1}">
+              <a14:hiddenFill xmlns:a14="http://schemas.microsoft.com/office/drawing/2010/main">
                 <a:solidFill>
-                  <a:schemeClr val="accent6">
-                    <a:lumMod val="60000"/>
-                    <a:lumOff val="40000"/>
-                  </a:schemeClr>
+                  <a:schemeClr val="accent1"/>
                 </a:solidFill>
-              </a:rPr>
-              <a:t>XmlDocument</a:t>
-            </a:r>
-            <a:endParaRPr lang="en-US" dirty="0" smtClean="0">
-              <a:solidFill>
-                <a:schemeClr val="accent6">
-                  <a:lumMod val="60000"/>
-                  <a:lumOff val="40000"/>
-                </a:schemeClr>
-              </a:solidFill>
-            </a:endParaRPr>
-          </a:p>
-          <a:p>
-            <a:r>
-              <a:rPr lang="en-US" dirty="0" err="1" smtClean="0"/>
-              <a:t>Transformarea</a:t>
-            </a:r>
-            <a:r>
-              <a:rPr lang="en-US" dirty="0" smtClean="0"/>
-              <a:t> </a:t>
-            </a:r>
-            <a:r>
-              <a:rPr lang="en-US" dirty="0" err="1" smtClean="0"/>
-              <a:t>documentului</a:t>
-            </a:r>
-            <a:r>
-              <a:rPr lang="en-US" dirty="0" smtClean="0"/>
-              <a:t> XML cu </a:t>
-            </a:r>
-            <a:r>
-              <a:rPr lang="en-US" dirty="0" err="1" smtClean="0"/>
-              <a:t>ajutorul</a:t>
-            </a:r>
-            <a:r>
-              <a:rPr lang="en-US" dirty="0" smtClean="0"/>
-              <a:t> </a:t>
-            </a:r>
-            <a:r>
-              <a:rPr lang="en-US" dirty="0" err="1" smtClean="0"/>
-              <a:t>fisierului</a:t>
-            </a:r>
-            <a:r>
-              <a:rPr lang="en-US" dirty="0" smtClean="0"/>
-              <a:t> XSL se face </a:t>
-            </a:r>
-            <a:r>
-              <a:rPr lang="en-US" dirty="0" err="1" smtClean="0"/>
-              <a:t>folosind</a:t>
-            </a:r>
-            <a:r>
-              <a:rPr lang="en-US" dirty="0" smtClean="0"/>
-              <a:t> </a:t>
-            </a:r>
-            <a:r>
-              <a:rPr lang="en-US" dirty="0" err="1" smtClean="0"/>
-              <a:t>clasa</a:t>
-            </a:r>
-            <a:r>
-              <a:rPr lang="en-US" dirty="0" smtClean="0"/>
-              <a:t> </a:t>
-            </a:r>
-            <a:r>
-              <a:rPr lang="en-US" dirty="0" err="1" smtClean="0">
+              </a14:hiddenFill>
+            </a:ext>
+            <a:ext uri="{91240B29-F687-4F45-9708-019B960494DF}">
+              <a14:hiddenLine xmlns:a14="http://schemas.microsoft.com/office/drawing/2010/main" w="9525">
                 <a:solidFill>
-                  <a:schemeClr val="accent6">
-                    <a:lumMod val="60000"/>
-                    <a:lumOff val="40000"/>
-                  </a:schemeClr>
+                  <a:schemeClr val="tx1"/>
                 </a:solidFill>
-              </a:rPr>
-              <a:t>XslCompiledTransform</a:t>
-            </a:r>
-            <a:endParaRPr lang="en-US" dirty="0"/>
-          </a:p>
-        </p:txBody>
-      </p:sp>
+                <a:miter lim="800000"/>
+                <a:headEnd/>
+                <a:tailEnd/>
+              </a14:hiddenLine>
+            </a:ext>
+            <a:ext uri="{AF507438-7753-43E0-B8FC-AC1667EBCBE1}">
+              <a14:hiddenEffects xmlns:a14="http://schemas.microsoft.com/office/drawing/2010/main">
+                <a:effectLst>
+                  <a:outerShdw dist="35921" dir="2700000" algn="ctr" rotWithShape="0">
+                    <a:schemeClr val="bg2"/>
+                  </a:outerShdw>
+                </a:effectLst>
+              </a14:hiddenEffects>
+            </a:ext>
+          </a:extLst>
+        </p:spPr>
+      </p:pic>
     </p:spTree>
+    <p:extLst>
+      <p:ext uri="{BB962C8B-B14F-4D97-AF65-F5344CB8AC3E}">
+        <p14:creationId xmlns:p14="http://schemas.microsoft.com/office/powerpoint/2010/main" val="3839338543"/>
+      </p:ext>
+    </p:extLst>
   </p:cSld>
   <p:clrMapOvr>
     <a:masterClrMapping/>
   </p:clrMapOvr>
+  <p:timing>
+    <p:tnLst>
+      <p:par>
+        <p:cTn id="1" dur="indefinite" restart="never" nodeType="tmRoot"/>
+      </p:par>
+    </p:tnLst>
+  </p:timing>
 </p:sld>
 </file>
 
@@ -4597,139 +4468,264 @@
             <p:ph type="title"/>
           </p:nvPr>
         </p:nvSpPr>
+        <p:spPr>
+          <a:xfrm>
+            <a:off x="1447800" y="304800"/>
+            <a:ext cx="7498080" cy="1143000"/>
+          </a:xfrm>
+        </p:spPr>
+        <p:txBody>
+          <a:bodyPr>
+            <a:normAutofit fontScale="90000"/>
+          </a:bodyPr>
+          <a:lstStyle/>
+          <a:p>
+            <a:r>
+              <a:rPr lang="en-US" dirty="0" smtClean="0"/>
+              <a:t>6. </a:t>
+            </a:r>
+            <a:r>
+              <a:rPr lang="en-US" dirty="0" err="1" smtClean="0"/>
+              <a:t>Limbaje</a:t>
+            </a:r>
+            <a:r>
+              <a:rPr lang="en-US" dirty="0" smtClean="0"/>
+              <a:t> </a:t>
+            </a:r>
+            <a:r>
+              <a:rPr lang="en-US" dirty="0" err="1" smtClean="0"/>
+              <a:t>si</a:t>
+            </a:r>
+            <a:r>
+              <a:rPr lang="en-US" dirty="0" smtClean="0"/>
+              <a:t> </a:t>
+            </a:r>
+            <a:r>
+              <a:rPr lang="en-US" smtClean="0"/>
+              <a:t>clase </a:t>
+            </a:r>
+            <a:r>
+              <a:rPr lang="en-US" dirty="0" err="1" smtClean="0"/>
+              <a:t>folosite</a:t>
+            </a:r>
+            <a:r>
+              <a:rPr lang="en-US" dirty="0" smtClean="0"/>
+              <a:t> </a:t>
+            </a:r>
+            <a:r>
+              <a:rPr lang="en-US" dirty="0" err="1" smtClean="0"/>
+              <a:t>pentru</a:t>
+            </a:r>
+            <a:r>
+              <a:rPr lang="en-US" dirty="0" smtClean="0"/>
+              <a:t> </a:t>
+            </a:r>
+            <a:r>
+              <a:rPr lang="en-US" dirty="0" err="1" smtClean="0"/>
+              <a:t>aplicatie</a:t>
+            </a:r>
+            <a:endParaRPr lang="en-US" dirty="0"/>
+          </a:p>
+        </p:txBody>
+      </p:sp>
+      <p:sp>
+        <p:nvSpPr>
+          <p:cNvPr id="3" name="Content Placeholder 2"/>
+          <p:cNvSpPr>
+            <a:spLocks noGrp="1"/>
+          </p:cNvSpPr>
+          <p:nvPr>
+            <p:ph idx="1"/>
+          </p:nvPr>
+        </p:nvSpPr>
         <p:spPr/>
         <p:txBody>
           <a:bodyPr/>
           <a:lstStyle/>
           <a:p>
             <a:r>
+              <a:rPr lang="en-US" dirty="0" err="1" smtClean="0"/>
+              <a:t>Aplicatia</a:t>
+            </a:r>
+            <a:r>
               <a:rPr lang="en-US" dirty="0" smtClean="0"/>
-              <a:t>7. </a:t>
+              <a:t> a </a:t>
             </a:r>
             <a:r>
               <a:rPr lang="en-US" dirty="0" err="1" smtClean="0"/>
-              <a:t>Bibiografie</a:t>
-            </a:r>
-            <a:endParaRPr lang="en-US" dirty="0"/>
-          </a:p>
-        </p:txBody>
-      </p:sp>
-      <p:sp>
-        <p:nvSpPr>
-          <p:cNvPr id="3" name="Content Placeholder 2"/>
-          <p:cNvSpPr>
-            <a:spLocks noGrp="1"/>
-          </p:cNvSpPr>
-          <p:nvPr>
-            <p:ph idx="1"/>
-          </p:nvPr>
-        </p:nvSpPr>
-        <p:spPr/>
-        <p:txBody>
-          <a:bodyPr>
-            <a:normAutofit fontScale="70000" lnSpcReduction="20000"/>
-          </a:bodyPr>
-          <a:lstStyle/>
-          <a:p>
-            <a:r>
-              <a:rPr lang="en-US" i="1" dirty="0" smtClean="0"/>
-              <a:t>1. </a:t>
-            </a:r>
-            <a:r>
-              <a:rPr lang="en-US" i="1" u="sng" dirty="0" smtClean="0">
-                <a:hlinkClick r:id="rId2"/>
-              </a:rPr>
-              <a:t>http://stackoverflow.com/questions/4447404/xml-files-to-web-form-with-net\</a:t>
-            </a:r>
-            <a:r>
-              <a:rPr lang="en-US" i="1" u="sng" dirty="0" smtClean="0">
-                <a:hlinkClick r:id="rId3"/>
-              </a:rPr>
-              <a:t>https://msdn.microsoft.com/en-us/library/extfcy1c(v=vs.110).aspx</a:t>
-            </a:r>
-            <a:endParaRPr lang="en-US" dirty="0" smtClean="0"/>
-          </a:p>
-          <a:p>
-            <a:r>
-              <a:rPr lang="en-US" i="1" dirty="0" smtClean="0"/>
-              <a:t>2. </a:t>
-            </a:r>
-            <a:r>
-              <a:rPr lang="en-US" i="1" u="sng" dirty="0" smtClean="0">
-                <a:hlinkClick r:id="rId4"/>
-              </a:rPr>
-              <a:t>http://stackoverflow.com/questions/215515/creating-an-xmlnode-xmlelement-in-c-sharp-without-an-xmldocument</a:t>
-            </a:r>
-            <a:endParaRPr lang="en-US" dirty="0" smtClean="0"/>
-          </a:p>
-          <a:p>
-            <a:r>
-              <a:rPr lang="en-US" i="1" dirty="0" smtClean="0"/>
-              <a:t>3. </a:t>
-            </a:r>
-            <a:r>
-              <a:rPr lang="en-US" i="1" u="sng" dirty="0" smtClean="0">
-                <a:hlinkClick r:id="rId5"/>
-              </a:rPr>
-              <a:t>http://stackoverflow.com/questions/740751/how-do-you-link-xml-to-a-xsd</a:t>
-            </a:r>
-            <a:endParaRPr lang="en-US" dirty="0" smtClean="0"/>
-          </a:p>
-          <a:p>
-            <a:r>
-              <a:rPr lang="en-US" i="1" dirty="0" smtClean="0"/>
-              <a:t>4. </a:t>
-            </a:r>
-            <a:r>
-              <a:rPr lang="en-US" i="1" u="sng" dirty="0" smtClean="0">
-                <a:hlinkClick r:id="rId6"/>
-              </a:rPr>
-              <a:t>http://www.w3schools.com/xml/schema_dtypes_date.asp</a:t>
-            </a:r>
-            <a:endParaRPr lang="en-US" dirty="0" smtClean="0"/>
-          </a:p>
-          <a:p>
-            <a:r>
-              <a:rPr lang="en-US" i="1" dirty="0" smtClean="0"/>
-              <a:t>5. </a:t>
-            </a:r>
-            <a:r>
-              <a:rPr lang="en-US" i="1" u="sng" dirty="0" smtClean="0">
-                <a:hlinkClick r:id="rId7"/>
-              </a:rPr>
-              <a:t>https://msdn.microsoft.com/en-us/library/aa983475(v=vs.80).aspx</a:t>
-            </a:r>
-            <a:endParaRPr lang="en-US" dirty="0" smtClean="0"/>
-          </a:p>
-          <a:p>
-            <a:r>
-              <a:rPr lang="en-US" i="1" dirty="0" smtClean="0"/>
-              <a:t>6.</a:t>
+              <a:t>fost</a:t>
             </a:r>
             <a:r>
               <a:rPr lang="en-US" dirty="0" smtClean="0"/>
               <a:t> </a:t>
             </a:r>
             <a:r>
-              <a:rPr lang="en-US" u="sng" dirty="0" smtClean="0">
-                <a:hlinkClick r:id="rId8"/>
+              <a:rPr lang="en-US" dirty="0" err="1" smtClean="0"/>
+              <a:t>realizata</a:t>
+            </a:r>
+            <a:r>
+              <a:rPr lang="en-US" dirty="0" smtClean="0"/>
+              <a:t> in Visual Studio </a:t>
+            </a:r>
+            <a:r>
+              <a:rPr lang="en-US" dirty="0" smtClean="0"/>
+              <a:t>2017 </a:t>
+            </a:r>
+            <a:r>
+              <a:rPr lang="en-US" dirty="0" smtClean="0"/>
+              <a:t>ca </a:t>
+            </a:r>
+            <a:r>
+              <a:rPr lang="en-US" dirty="0" err="1" smtClean="0"/>
+              <a:t>proiect</a:t>
+            </a:r>
+            <a:r>
+              <a:rPr lang="en-US" dirty="0" smtClean="0"/>
+              <a:t> de tip </a:t>
+            </a:r>
+            <a:r>
+              <a:rPr lang="en-US" dirty="0" smtClean="0"/>
+              <a:t>Windows Form</a:t>
+            </a:r>
+            <a:endParaRPr lang="en-US" dirty="0" smtClean="0"/>
+          </a:p>
+          <a:p>
+            <a:r>
+              <a:rPr lang="en-US" dirty="0" err="1" smtClean="0"/>
+              <a:t>Limbaje</a:t>
+            </a:r>
+            <a:r>
+              <a:rPr lang="en-US" dirty="0" smtClean="0"/>
+              <a:t>: </a:t>
+            </a:r>
+            <a:r>
+              <a:rPr lang="en-US" dirty="0" smtClean="0"/>
+              <a:t>C#</a:t>
+            </a:r>
+            <a:endParaRPr lang="en-US" dirty="0" smtClean="0"/>
+          </a:p>
+          <a:p>
+            <a:r>
+              <a:rPr lang="en-US" dirty="0" err="1" smtClean="0"/>
+              <a:t>Pentru</a:t>
+            </a:r>
+            <a:r>
+              <a:rPr lang="en-US" dirty="0" smtClean="0"/>
+              <a:t> </a:t>
+            </a:r>
+            <a:r>
+              <a:rPr lang="en-US" dirty="0" err="1" smtClean="0"/>
+              <a:t>parsarea</a:t>
+            </a:r>
+            <a:r>
+              <a:rPr lang="en-US" dirty="0" smtClean="0"/>
+              <a:t> </a:t>
+            </a:r>
+            <a:r>
+              <a:rPr lang="en-US" dirty="0" err="1" smtClean="0"/>
+              <a:t>documentului</a:t>
+            </a:r>
+            <a:r>
+              <a:rPr lang="en-US" dirty="0" smtClean="0"/>
+              <a:t> am </a:t>
+            </a:r>
+            <a:r>
+              <a:rPr lang="en-US" dirty="0" err="1" smtClean="0"/>
+              <a:t>folosit</a:t>
+            </a:r>
+            <a:r>
+              <a:rPr lang="en-US" dirty="0" smtClean="0"/>
+              <a:t> </a:t>
+            </a:r>
+            <a:r>
+              <a:rPr lang="en-US" dirty="0" err="1" smtClean="0"/>
+              <a:t>clasa</a:t>
+            </a:r>
+            <a:r>
+              <a:rPr lang="en-US" dirty="0" smtClean="0"/>
+              <a:t> </a:t>
+            </a:r>
+            <a:r>
+              <a:rPr lang="en-US" dirty="0" err="1" smtClean="0">
+                <a:solidFill>
+                  <a:schemeClr val="accent6">
+                    <a:lumMod val="60000"/>
+                    <a:lumOff val="40000"/>
+                  </a:schemeClr>
+                </a:solidFill>
               </a:rPr>
-              <a:t>http://xmlwriter.net/xml_guide/element_declaration.shtml</a:t>
-            </a:r>
-            <a:endParaRPr lang="en-US" dirty="0" smtClean="0"/>
-          </a:p>
-          <a:p>
-            <a:r>
-              <a:rPr lang="en-US" i="1" dirty="0" smtClean="0"/>
-              <a:t>7. </a:t>
-            </a:r>
-            <a:r>
-              <a:rPr lang="en-US" u="sng" dirty="0" smtClean="0">
-                <a:hlinkClick r:id="rId9"/>
+              <a:t>XmlDocument</a:t>
+            </a:r>
+            <a:endParaRPr lang="en-US" dirty="0" smtClean="0">
+              <a:solidFill>
+                <a:schemeClr val="accent6">
+                  <a:lumMod val="60000"/>
+                  <a:lumOff val="40000"/>
+                </a:schemeClr>
+              </a:solidFill>
+            </a:endParaRPr>
+          </a:p>
+          <a:p>
+            <a:r>
+              <a:rPr lang="en-US" dirty="0" err="1" smtClean="0"/>
+              <a:t>Transformarea</a:t>
+            </a:r>
+            <a:r>
+              <a:rPr lang="en-US" dirty="0" smtClean="0"/>
+              <a:t> </a:t>
+            </a:r>
+            <a:r>
+              <a:rPr lang="en-US" dirty="0" err="1" smtClean="0"/>
+              <a:t>documentului</a:t>
+            </a:r>
+            <a:r>
+              <a:rPr lang="en-US" dirty="0" smtClean="0"/>
+              <a:t> XML cu </a:t>
+            </a:r>
+            <a:r>
+              <a:rPr lang="en-US" dirty="0" err="1" smtClean="0"/>
+              <a:t>ajutorul</a:t>
+            </a:r>
+            <a:r>
+              <a:rPr lang="en-US" dirty="0" smtClean="0"/>
+              <a:t> </a:t>
+            </a:r>
+            <a:r>
+              <a:rPr lang="en-US" dirty="0" err="1" smtClean="0"/>
+              <a:t>fisierului</a:t>
+            </a:r>
+            <a:r>
+              <a:rPr lang="en-US" dirty="0" smtClean="0"/>
+              <a:t> XSL se face </a:t>
+            </a:r>
+            <a:r>
+              <a:rPr lang="en-US" dirty="0" err="1" smtClean="0"/>
+              <a:t>folosind</a:t>
+            </a:r>
+            <a:r>
+              <a:rPr lang="en-US" dirty="0" smtClean="0"/>
+              <a:t> </a:t>
+            </a:r>
+            <a:r>
+              <a:rPr lang="en-US" dirty="0" err="1" smtClean="0"/>
+              <a:t>clasa</a:t>
+            </a:r>
+            <a:r>
+              <a:rPr lang="en-US" dirty="0" smtClean="0"/>
+              <a:t> </a:t>
+            </a:r>
+            <a:r>
+              <a:rPr lang="en-US" dirty="0" err="1" smtClean="0">
+                <a:solidFill>
+                  <a:schemeClr val="accent6">
+                    <a:lumMod val="60000"/>
+                    <a:lumOff val="40000"/>
+                  </a:schemeClr>
+                </a:solidFill>
               </a:rPr>
-              <a:t>http://xmlvalidation.com/</a:t>
-            </a:r>
-            <a:endParaRPr lang="en-US" dirty="0" smtClean="0"/>
+              <a:t>XslCompiledTransform</a:t>
+            </a:r>
+            <a:endParaRPr lang="en-US" dirty="0"/>
           </a:p>
         </p:txBody>
       </p:sp>
@@ -4738,6 +4734,13 @@
   <p:clrMapOvr>
     <a:masterClrMapping/>
   </p:clrMapOvr>
+  <p:timing>
+    <p:tnLst>
+      <p:par>
+        <p:cTn id="1" dur="indefinite" restart="never" nodeType="tmRoot"/>
+      </p:par>
+    </p:tnLst>
+  </p:timing>
 </p:sld>
 </file>
 
@@ -4758,18 +4761,246 @@
           <a:chExt cx="0" cy="0"/>
         </a:xfrm>
       </p:grpSpPr>
+      <p:sp>
+        <p:nvSpPr>
+          <p:cNvPr id="2" name="Title 1"/>
+          <p:cNvSpPr>
+            <a:spLocks noGrp="1"/>
+          </p:cNvSpPr>
+          <p:nvPr>
+            <p:ph type="title"/>
+          </p:nvPr>
+        </p:nvSpPr>
+        <p:spPr/>
+        <p:txBody>
+          <a:bodyPr/>
+          <a:lstStyle/>
+          <a:p>
+            <a:r>
+              <a:rPr lang="en-US" dirty="0" smtClean="0"/>
+              <a:t>7. </a:t>
+            </a:r>
+            <a:r>
+              <a:rPr lang="en-US" dirty="0" err="1" smtClean="0"/>
+              <a:t>Bibiografie</a:t>
+            </a:r>
+            <a:endParaRPr lang="en-US" dirty="0"/>
+          </a:p>
+        </p:txBody>
+      </p:sp>
+      <p:sp>
+        <p:nvSpPr>
+          <p:cNvPr id="3" name="Content Placeholder 2"/>
+          <p:cNvSpPr>
+            <a:spLocks noGrp="1"/>
+          </p:cNvSpPr>
+          <p:nvPr>
+            <p:ph idx="1"/>
+          </p:nvPr>
+        </p:nvSpPr>
+        <p:spPr/>
+        <p:txBody>
+          <a:bodyPr>
+            <a:normAutofit fontScale="62500" lnSpcReduction="20000"/>
+          </a:bodyPr>
+          <a:lstStyle/>
+          <a:p>
+            <a:r>
+              <a:rPr lang="en-US" b="1" i="1" dirty="0"/>
+              <a:t>1. </a:t>
+            </a:r>
+            <a:r>
+              <a:rPr lang="en-US" b="1" i="1" u="sng" dirty="0">
+                <a:hlinkClick r:id="rId2"/>
+              </a:rPr>
+              <a:t>http://stackoverflow.com/questions/4447404/xml-files-to-web-form-with-net\</a:t>
+            </a:r>
+            <a:r>
+              <a:rPr lang="en-US" b="1" i="1" u="sng" dirty="0">
+                <a:hlinkClick r:id="rId3"/>
+              </a:rPr>
+              <a:t>https://msdn.microsoft.com/en-us/library/extfcy1c(v=vs.110).aspx</a:t>
+            </a:r>
+            <a:endParaRPr lang="en-US" dirty="0"/>
+          </a:p>
+          <a:p>
+            <a:r>
+              <a:rPr lang="en-US" b="1" i="1" dirty="0"/>
+              <a:t>2. </a:t>
+            </a:r>
+            <a:r>
+              <a:rPr lang="en-US" b="1" i="1" u="sng" dirty="0">
+                <a:hlinkClick r:id="rId4"/>
+              </a:rPr>
+              <a:t>http://stackoverflow.com/questions/215515/creating-an-xmlnode-xmlelement-in-c-sharp-without-an-xmldocument</a:t>
+            </a:r>
+            <a:endParaRPr lang="en-US" dirty="0"/>
+          </a:p>
+          <a:p>
+            <a:r>
+              <a:rPr lang="en-US" b="1" i="1" dirty="0"/>
+              <a:t>3. </a:t>
+            </a:r>
+            <a:r>
+              <a:rPr lang="en-US" b="1" i="1" u="sng" dirty="0">
+                <a:hlinkClick r:id="rId5"/>
+              </a:rPr>
+              <a:t>http://stackoverflow.com/questions/1462049/xslt-adding-elements-dynamically?rq=1</a:t>
+            </a:r>
+            <a:endParaRPr lang="en-US" dirty="0"/>
+          </a:p>
+          <a:p>
+            <a:r>
+              <a:rPr lang="en-US" b="1" i="1" dirty="0"/>
+              <a:t>4. </a:t>
+            </a:r>
+            <a:r>
+              <a:rPr lang="en-US" b="1" u="sng" dirty="0">
+                <a:hlinkClick r:id="rId6"/>
+              </a:rPr>
+              <a:t>http://xmlvalidation.com/</a:t>
+            </a:r>
+            <a:endParaRPr lang="en-US" dirty="0"/>
+          </a:p>
+          <a:p>
+            <a:r>
+              <a:rPr lang="en-US" b="1" i="1" dirty="0"/>
+              <a:t>5. </a:t>
+            </a:r>
+            <a:r>
+              <a:rPr lang="en-US" b="1" i="1" u="sng" dirty="0">
+                <a:hlinkClick r:id="rId7"/>
+              </a:rPr>
+              <a:t>https://msdn.microsoft.com/en-us/library/aa983475(v=vs.80).aspx</a:t>
+            </a:r>
+            <a:endParaRPr lang="en-US" dirty="0"/>
+          </a:p>
+          <a:p>
+            <a:r>
+              <a:rPr lang="en-US" b="1" i="1" dirty="0"/>
+              <a:t>6.</a:t>
+            </a:r>
+            <a:r>
+              <a:rPr lang="en-US" b="1" dirty="0"/>
+              <a:t> </a:t>
+            </a:r>
+            <a:r>
+              <a:rPr lang="en-US" b="1" u="sng" dirty="0">
+                <a:hlinkClick r:id="rId8"/>
+              </a:rPr>
+              <a:t>http://xmlwriter.net/xml_guide/element_declaration.shtml</a:t>
+            </a:r>
+            <a:endParaRPr lang="en-US" dirty="0"/>
+          </a:p>
+          <a:p>
+            <a:r>
+              <a:rPr lang="en-US" b="1" i="1" dirty="0"/>
+              <a:t>7.</a:t>
+            </a:r>
+            <a:r>
+              <a:rPr lang="en-US" b="1" dirty="0"/>
+              <a:t> </a:t>
+            </a:r>
+            <a:r>
+              <a:rPr lang="en-US" b="1" u="sng" dirty="0">
+                <a:hlinkClick r:id="rId9"/>
+              </a:rPr>
+              <a:t>https://en.wikipedia.org/wiki/XML_Schema_(W3C)</a:t>
+            </a:r>
+            <a:endParaRPr lang="en-US" dirty="0"/>
+          </a:p>
+          <a:p>
+            <a:r>
+              <a:rPr lang="en-US" b="1" i="1" dirty="0"/>
+              <a:t>8.</a:t>
+            </a:r>
+            <a:r>
+              <a:rPr lang="en-US" b="1" dirty="0"/>
+              <a:t> </a:t>
+            </a:r>
+            <a:r>
+              <a:rPr lang="en-US" b="1" u="sng" dirty="0">
+                <a:hlinkClick r:id="rId10"/>
+              </a:rPr>
+              <a:t>https://</a:t>
+            </a:r>
+            <a:r>
+              <a:rPr lang="en-US" b="1" u="sng" dirty="0" smtClean="0">
+                <a:hlinkClick r:id="rId10"/>
+              </a:rPr>
+              <a:t>en.wikipedia.org/wiki/XSLT</a:t>
+            </a:r>
+            <a:endParaRPr lang="en-US" dirty="0"/>
+          </a:p>
+        </p:txBody>
+      </p:sp>
+    </p:spTree>
+  </p:cSld>
+  <p:clrMapOvr>
+    <a:masterClrMapping/>
+  </p:clrMapOvr>
+  <p:timing>
+    <p:tnLst>
+      <p:par>
+        <p:cTn id="1" dur="indefinite" restart="never" nodeType="tmRoot"/>
+      </p:par>
+    </p:tnLst>
+  </p:timing>
+</p:sld>
+</file>
+
+<file path=ppt/slides/slide13.xml><?xml version="1.0" encoding="utf-8"?>
+<p:sld xmlns:a="http://schemas.openxmlformats.org/drawingml/2006/main" xmlns:r="http://schemas.openxmlformats.org/officeDocument/2006/relationships" xmlns:p="http://schemas.openxmlformats.org/presentationml/2006/main">
+  <p:cSld>
+    <p:spTree>
+      <p:nvGrpSpPr>
+        <p:cNvPr id="1" name=""/>
+        <p:cNvGrpSpPr/>
+        <p:nvPr/>
+      </p:nvGrpSpPr>
+      <p:grpSpPr>
+        <a:xfrm>
+          <a:off x="0" y="0"/>
+          <a:ext cx="0" cy="0"/>
+          <a:chOff x="0" y="0"/>
+          <a:chExt cx="0" cy="0"/>
+        </a:xfrm>
+      </p:grpSpPr>
+      <p:sp>
+        <p:nvSpPr>
+          <p:cNvPr id="2" name="Content Placeholder 1"/>
+          <p:cNvSpPr>
+            <a:spLocks noGrp="1"/>
+          </p:cNvSpPr>
+          <p:nvPr>
+            <p:ph idx="1"/>
+          </p:nvPr>
+        </p:nvSpPr>
+        <p:spPr/>
+        <p:txBody>
+          <a:bodyPr/>
+          <a:lstStyle/>
+          <a:p>
+            <a:endParaRPr lang="en-US" dirty="0"/>
+          </a:p>
+        </p:txBody>
+      </p:sp>
       <p:pic>
         <p:nvPicPr>
-          <p:cNvPr id="7170" name="Picture 2" descr="C:\Users\Iuliana\Downloads\securitate-energetica-si-intelligence-8-638.jpg"/>
+          <p:cNvPr id="9218" name="Picture 2" descr="http://www.ziuaconstanta.ro/images/stories/2016/01/11/Divertisment/stiati_ca.jpg"/>
           <p:cNvPicPr>
-            <a:picLocks noGrp="1" noChangeAspect="1" noChangeArrowheads="1"/>
+            <a:picLocks noChangeAspect="1" noChangeArrowheads="1"/>
           </p:cNvPicPr>
-          <p:nvPr>
-            <p:ph idx="1"/>
-          </p:nvPr>
+          <p:nvPr/>
         </p:nvPicPr>
         <p:blipFill>
-          <a:blip r:embed="rId2"/>
+          <a:blip r:embed="rId2">
+            <a:extLst>
+              <a:ext uri="{28A0092B-C50C-407E-A947-70E740481C1C}">
+                <a14:useLocalDpi xmlns:a14="http://schemas.microsoft.com/office/drawing/2010/main" val="0"/>
+              </a:ext>
+            </a:extLst>
+          </a:blip>
           <a:srcRect/>
           <a:stretch>
             <a:fillRect/>
@@ -4777,13 +5008,22 @@
         </p:blipFill>
         <p:spPr bwMode="auto">
           <a:xfrm>
-            <a:off x="1055068" y="0"/>
-            <a:ext cx="8088932" cy="6858000"/>
+            <a:off x="990600" y="0"/>
+            <a:ext cx="8153400" cy="6858000"/>
           </a:xfrm>
           <a:prstGeom prst="rect">
             <a:avLst/>
           </a:prstGeom>
           <a:noFill/>
+          <a:extLst>
+            <a:ext uri="{909E8E84-426E-40DD-AFC4-6F175D3DCCD1}">
+              <a14:hiddenFill xmlns:a14="http://schemas.microsoft.com/office/drawing/2010/main">
+                <a:solidFill>
+                  <a:srgbClr val="FFFFFF"/>
+                </a:solidFill>
+              </a14:hiddenFill>
+            </a:ext>
+          </a:extLst>
         </p:spPr>
       </p:pic>
     </p:spTree>
@@ -4791,6 +5031,147 @@
   <p:clrMapOvr>
     <a:masterClrMapping/>
   </p:clrMapOvr>
+  <p:timing>
+    <p:tnLst>
+      <p:par>
+        <p:cTn id="1" dur="indefinite" restart="never" nodeType="tmRoot"/>
+      </p:par>
+    </p:tnLst>
+  </p:timing>
+</p:sld>
+</file>
+
+<file path=ppt/slides/slide14.xml><?xml version="1.0" encoding="utf-8"?>
+<p:sld xmlns:a="http://schemas.openxmlformats.org/drawingml/2006/main" xmlns:r="http://schemas.openxmlformats.org/officeDocument/2006/relationships" xmlns:p="http://schemas.openxmlformats.org/presentationml/2006/main">
+  <p:cSld>
+    <p:spTree>
+      <p:nvGrpSpPr>
+        <p:cNvPr id="1" name=""/>
+        <p:cNvGrpSpPr/>
+        <p:nvPr/>
+      </p:nvGrpSpPr>
+      <p:grpSpPr>
+        <a:xfrm>
+          <a:off x="0" y="0"/>
+          <a:ext cx="0" cy="0"/>
+          <a:chOff x="0" y="0"/>
+          <a:chExt cx="0" cy="0"/>
+        </a:xfrm>
+      </p:grpSpPr>
+      <p:sp>
+        <p:nvSpPr>
+          <p:cNvPr id="2" name="Title 1"/>
+          <p:cNvSpPr>
+            <a:spLocks noGrp="1"/>
+          </p:cNvSpPr>
+          <p:nvPr>
+            <p:ph type="title"/>
+          </p:nvPr>
+        </p:nvSpPr>
+        <p:spPr/>
+        <p:txBody>
+          <a:bodyPr/>
+          <a:lstStyle/>
+          <a:p>
+            <a:r>
+              <a:rPr lang="en-US" dirty="0" smtClean="0"/>
+              <a:t>                 </a:t>
+            </a:r>
+            <a:r>
+              <a:rPr lang="en-US" dirty="0" err="1" smtClean="0"/>
+              <a:t>Intrebari</a:t>
+            </a:r>
+            <a:r>
+              <a:rPr lang="en-US" dirty="0" smtClean="0"/>
+              <a:t>?</a:t>
+            </a:r>
+            <a:endParaRPr lang="en-US" dirty="0"/>
+          </a:p>
+        </p:txBody>
+      </p:sp>
+      <p:pic>
+        <p:nvPicPr>
+          <p:cNvPr id="10242" name="Picture 2"/>
+          <p:cNvPicPr>
+            <a:picLocks noGrp="1" noChangeAspect="1" noChangeArrowheads="1"/>
+          </p:cNvPicPr>
+          <p:nvPr>
+            <p:ph idx="1"/>
+          </p:nvPr>
+        </p:nvPicPr>
+        <p:blipFill>
+          <a:blip r:embed="rId2">
+            <a:extLst>
+              <a:ext uri="{28A0092B-C50C-407E-A947-70E740481C1C}">
+                <a14:useLocalDpi xmlns:a14="http://schemas.microsoft.com/office/drawing/2010/main" val="0"/>
+              </a:ext>
+            </a:extLst>
+          </a:blip>
+          <a:srcRect/>
+          <a:stretch>
+            <a:fillRect/>
+          </a:stretch>
+        </p:blipFill>
+        <p:spPr bwMode="auto">
+          <a:xfrm>
+            <a:off x="1905000" y="1371600"/>
+            <a:ext cx="6181989" cy="4648200"/>
+          </a:xfrm>
+          <a:prstGeom prst="rect">
+            <a:avLst/>
+          </a:prstGeom>
+          <a:noFill/>
+          <a:ln>
+            <a:noFill/>
+          </a:ln>
+          <a:effectLst/>
+          <a:extLst>
+            <a:ext uri="{909E8E84-426E-40DD-AFC4-6F175D3DCCD1}">
+              <a14:hiddenFill xmlns:a14="http://schemas.microsoft.com/office/drawing/2010/main">
+                <a:solidFill>
+                  <a:schemeClr val="accent1"/>
+                </a:solidFill>
+              </a14:hiddenFill>
+            </a:ext>
+            <a:ext uri="{91240B29-F687-4F45-9708-019B960494DF}">
+              <a14:hiddenLine xmlns:a14="http://schemas.microsoft.com/office/drawing/2010/main" w="9525">
+                <a:solidFill>
+                  <a:schemeClr val="tx1"/>
+                </a:solidFill>
+                <a:miter lim="800000"/>
+                <a:headEnd/>
+                <a:tailEnd/>
+              </a14:hiddenLine>
+            </a:ext>
+            <a:ext uri="{AF507438-7753-43E0-B8FC-AC1667EBCBE1}">
+              <a14:hiddenEffects xmlns:a14="http://schemas.microsoft.com/office/drawing/2010/main">
+                <a:effectLst>
+                  <a:outerShdw dist="35921" dir="2700000" algn="ctr" rotWithShape="0">
+                    <a:schemeClr val="bg2"/>
+                  </a:outerShdw>
+                </a:effectLst>
+              </a14:hiddenEffects>
+            </a:ext>
+          </a:extLst>
+        </p:spPr>
+      </p:pic>
+    </p:spTree>
+    <p:extLst>
+      <p:ext uri="{BB962C8B-B14F-4D97-AF65-F5344CB8AC3E}">
+        <p14:creationId xmlns:p14="http://schemas.microsoft.com/office/powerpoint/2010/main" val="1810013925"/>
+      </p:ext>
+    </p:extLst>
+  </p:cSld>
+  <p:clrMapOvr>
+    <a:masterClrMapping/>
+  </p:clrMapOvr>
+  <p:timing>
+    <p:tnLst>
+      <p:par>
+        <p:cTn id="1" dur="indefinite" restart="never" nodeType="tmRoot"/>
+      </p:par>
+    </p:tnLst>
+  </p:timing>
 </p:sld>
 </file>
 
@@ -4850,80 +5231,316 @@
           <a:lstStyle/>
           <a:p>
             <a:r>
-              <a:rPr lang="en-US" dirty="0" smtClean="0"/>
-              <a:t>1. </a:t>
-            </a:r>
-            <a:r>
-              <a:rPr lang="en-US" dirty="0" err="1" smtClean="0"/>
-              <a:t>Documentul</a:t>
-            </a:r>
-            <a:r>
-              <a:rPr lang="en-US" dirty="0" smtClean="0"/>
+              <a:rPr lang="en-US" b="1" i="1" dirty="0">
+                <a:solidFill>
+                  <a:schemeClr val="accent1">
+                    <a:lumMod val="60000"/>
+                    <a:lumOff val="40000"/>
+                  </a:schemeClr>
+                </a:solidFill>
+              </a:rPr>
+              <a:t>1.Descrierea </a:t>
+            </a:r>
+            <a:r>
+              <a:rPr lang="en-US" b="1" i="1" dirty="0" err="1">
+                <a:solidFill>
+                  <a:schemeClr val="accent1">
+                    <a:lumMod val="60000"/>
+                    <a:lumOff val="40000"/>
+                  </a:schemeClr>
+                </a:solidFill>
+              </a:rPr>
+              <a:t>domeniului</a:t>
+            </a:r>
+            <a:endParaRPr lang="en-US" dirty="0">
+              <a:solidFill>
+                <a:schemeClr val="accent1">
+                  <a:lumMod val="60000"/>
+                  <a:lumOff val="40000"/>
+                </a:schemeClr>
+              </a:solidFill>
+            </a:endParaRPr>
+          </a:p>
+          <a:p>
+            <a:r>
+              <a:rPr lang="en-US" b="1" i="1" dirty="0">
+                <a:solidFill>
+                  <a:schemeClr val="accent1">
+                    <a:lumMod val="60000"/>
+                    <a:lumOff val="40000"/>
+                  </a:schemeClr>
+                </a:solidFill>
+              </a:rPr>
+              <a:t>2.Proiectarea </a:t>
+            </a:r>
+            <a:r>
+              <a:rPr lang="en-US" b="1" i="1" dirty="0" err="1">
+                <a:solidFill>
+                  <a:schemeClr val="accent1">
+                    <a:lumMod val="60000"/>
+                    <a:lumOff val="40000"/>
+                  </a:schemeClr>
+                </a:solidFill>
+              </a:rPr>
+              <a:t>documentului</a:t>
+            </a:r>
+            <a:r>
+              <a:rPr lang="en-US" b="1" i="1" dirty="0">
+                <a:solidFill>
+                  <a:schemeClr val="accent1">
+                    <a:lumMod val="60000"/>
+                    <a:lumOff val="40000"/>
+                  </a:schemeClr>
+                </a:solidFill>
+              </a:rPr>
               <a:t> XML</a:t>
             </a:r>
-          </a:p>
-          <a:p>
-            <a:r>
-              <a:rPr lang="en-US" dirty="0" smtClean="0"/>
-              <a:t>2.Documentul DTD</a:t>
-            </a:r>
-          </a:p>
-          <a:p>
-            <a:r>
-              <a:rPr lang="en-US" dirty="0" smtClean="0"/>
-              <a:t>3. XSD Schema - </a:t>
-            </a:r>
-            <a:r>
-              <a:rPr lang="en-US" dirty="0" err="1" smtClean="0"/>
-              <a:t>Restrictie</a:t>
-            </a:r>
-            <a:endParaRPr lang="en-US" dirty="0" smtClean="0"/>
-          </a:p>
-          <a:p>
-            <a:r>
-              <a:rPr lang="en-US" dirty="0" smtClean="0"/>
-              <a:t>4.Document XSL Transform</a:t>
-            </a:r>
-          </a:p>
-          <a:p>
-            <a:r>
-              <a:rPr lang="en-US" dirty="0" smtClean="0"/>
-              <a:t>5.Aplicatia</a:t>
-            </a:r>
-          </a:p>
-          <a:p>
-            <a:r>
-              <a:rPr lang="en-US" dirty="0" smtClean="0"/>
-              <a:t>6.Limbaje </a:t>
-            </a:r>
-            <a:r>
-              <a:rPr lang="en-US" dirty="0" err="1" smtClean="0"/>
-              <a:t>si</a:t>
-            </a:r>
-            <a:r>
-              <a:rPr lang="en-US" dirty="0" smtClean="0"/>
+            <a:endParaRPr lang="en-US" dirty="0">
+              <a:solidFill>
+                <a:schemeClr val="accent1">
+                  <a:lumMod val="60000"/>
+                  <a:lumOff val="40000"/>
+                </a:schemeClr>
+              </a:solidFill>
+            </a:endParaRPr>
+          </a:p>
+          <a:p>
+            <a:r>
+              <a:rPr lang="en-US" b="1" i="1" dirty="0" smtClean="0">
+                <a:solidFill>
+                  <a:schemeClr val="accent1">
+                    <a:lumMod val="60000"/>
+                    <a:lumOff val="40000"/>
+                  </a:schemeClr>
+                </a:solidFill>
+              </a:rPr>
+              <a:t>3.Proiectarea </a:t>
+            </a:r>
+            <a:r>
+              <a:rPr lang="en-US" b="1" i="1" dirty="0">
+                <a:solidFill>
+                  <a:schemeClr val="accent1">
+                    <a:lumMod val="60000"/>
+                    <a:lumOff val="40000"/>
+                  </a:schemeClr>
+                </a:solidFill>
+              </a:rPr>
+              <a:t>DTD-</a:t>
+            </a:r>
+            <a:r>
+              <a:rPr lang="en-US" b="1" i="1" dirty="0" err="1">
+                <a:solidFill>
+                  <a:schemeClr val="accent1">
+                    <a:lumMod val="60000"/>
+                    <a:lumOff val="40000"/>
+                  </a:schemeClr>
+                </a:solidFill>
+              </a:rPr>
+              <a:t>ului</a:t>
+            </a:r>
+            <a:r>
+              <a:rPr lang="en-US" b="1" i="1" dirty="0">
+                <a:solidFill>
+                  <a:schemeClr val="accent1">
+                    <a:lumMod val="60000"/>
+                    <a:lumOff val="40000"/>
+                  </a:schemeClr>
+                </a:solidFill>
+              </a:rPr>
               <a:t> </a:t>
             </a:r>
             <a:r>
-              <a:rPr lang="en-US" dirty="0" err="1" smtClean="0"/>
-              <a:t>clase</a:t>
-            </a:r>
-            <a:r>
-              <a:rPr lang="en-US" dirty="0" smtClean="0"/>
+              <a:rPr lang="en-US" b="1" i="1" dirty="0" err="1">
+                <a:solidFill>
+                  <a:schemeClr val="accent1">
+                    <a:lumMod val="60000"/>
+                    <a:lumOff val="40000"/>
+                  </a:schemeClr>
+                </a:solidFill>
+              </a:rPr>
+              <a:t>asociat</a:t>
+            </a:r>
+            <a:r>
+              <a:rPr lang="en-US" b="1" i="1" dirty="0">
+                <a:solidFill>
+                  <a:schemeClr val="accent1">
+                    <a:lumMod val="60000"/>
+                    <a:lumOff val="40000"/>
+                  </a:schemeClr>
+                </a:solidFill>
+              </a:rPr>
               <a:t> </a:t>
             </a:r>
             <a:r>
-              <a:rPr lang="en-US" dirty="0" err="1" smtClean="0"/>
-              <a:t>folosite</a:t>
-            </a:r>
-            <a:endParaRPr lang="en-US" dirty="0" smtClean="0"/>
-          </a:p>
-          <a:p>
-            <a:r>
-              <a:rPr lang="en-US" dirty="0" smtClean="0"/>
-              <a:t>7.Bibliografie</a:t>
-            </a:r>
-            <a:endParaRPr lang="en-US" dirty="0"/>
+              <a:rPr lang="en-US" b="1" i="1" dirty="0" err="1">
+                <a:solidFill>
+                  <a:schemeClr val="accent1">
+                    <a:lumMod val="60000"/>
+                    <a:lumOff val="40000"/>
+                  </a:schemeClr>
+                </a:solidFill>
+              </a:rPr>
+              <a:t>documentului</a:t>
+            </a:r>
+            <a:r>
+              <a:rPr lang="en-US" b="1" i="1" dirty="0">
+                <a:solidFill>
+                  <a:schemeClr val="accent1">
+                    <a:lumMod val="60000"/>
+                    <a:lumOff val="40000"/>
+                  </a:schemeClr>
+                </a:solidFill>
+              </a:rPr>
+              <a:t> XML</a:t>
+            </a:r>
+            <a:endParaRPr lang="en-US" dirty="0">
+              <a:solidFill>
+                <a:schemeClr val="accent1">
+                  <a:lumMod val="60000"/>
+                  <a:lumOff val="40000"/>
+                </a:schemeClr>
+              </a:solidFill>
+            </a:endParaRPr>
+          </a:p>
+          <a:p>
+            <a:r>
+              <a:rPr lang="en-US" b="1" i="1" dirty="0">
+                <a:solidFill>
+                  <a:schemeClr val="accent1">
+                    <a:lumMod val="60000"/>
+                    <a:lumOff val="40000"/>
+                  </a:schemeClr>
+                </a:solidFill>
+              </a:rPr>
+              <a:t>4.Descrierea </a:t>
+            </a:r>
+            <a:r>
+              <a:rPr lang="en-US" b="1" i="1" dirty="0" err="1">
+                <a:solidFill>
+                  <a:schemeClr val="accent1">
+                    <a:lumMod val="60000"/>
+                    <a:lumOff val="40000"/>
+                  </a:schemeClr>
+                </a:solidFill>
+              </a:rPr>
+              <a:t>aplicatiei</a:t>
+            </a:r>
+            <a:endParaRPr lang="en-US" dirty="0">
+              <a:solidFill>
+                <a:schemeClr val="accent1">
+                  <a:lumMod val="60000"/>
+                  <a:lumOff val="40000"/>
+                </a:schemeClr>
+              </a:solidFill>
+            </a:endParaRPr>
+          </a:p>
+          <a:p>
+            <a:r>
+              <a:rPr lang="en-US" b="1" i="1" dirty="0">
+                <a:solidFill>
+                  <a:schemeClr val="accent1">
+                    <a:lumMod val="60000"/>
+                    <a:lumOff val="40000"/>
+                  </a:schemeClr>
+                </a:solidFill>
+              </a:rPr>
+              <a:t>5.Proiectarea </a:t>
+            </a:r>
+            <a:r>
+              <a:rPr lang="en-US" b="1" i="1" dirty="0" err="1">
+                <a:solidFill>
+                  <a:schemeClr val="accent1">
+                    <a:lumMod val="60000"/>
+                    <a:lumOff val="40000"/>
+                  </a:schemeClr>
+                </a:solidFill>
+              </a:rPr>
+              <a:t>fisierului</a:t>
+            </a:r>
+            <a:r>
+              <a:rPr lang="en-US" b="1" i="1" dirty="0">
+                <a:solidFill>
+                  <a:schemeClr val="accent1">
+                    <a:lumMod val="60000"/>
+                    <a:lumOff val="40000"/>
+                  </a:schemeClr>
+                </a:solidFill>
+              </a:rPr>
+              <a:t> XSD </a:t>
+            </a:r>
+            <a:r>
+              <a:rPr lang="en-US" b="1" i="1" dirty="0" err="1">
+                <a:solidFill>
+                  <a:schemeClr val="accent1">
+                    <a:lumMod val="60000"/>
+                    <a:lumOff val="40000"/>
+                  </a:schemeClr>
+                </a:solidFill>
+              </a:rPr>
+              <a:t>pentru</a:t>
+            </a:r>
+            <a:r>
+              <a:rPr lang="en-US" b="1" i="1" dirty="0">
+                <a:solidFill>
+                  <a:schemeClr val="accent1">
+                    <a:lumMod val="60000"/>
+                    <a:lumOff val="40000"/>
+                  </a:schemeClr>
+                </a:solidFill>
+              </a:rPr>
+              <a:t> </a:t>
+            </a:r>
+            <a:r>
+              <a:rPr lang="en-US" b="1" i="1" dirty="0" err="1">
+                <a:solidFill>
+                  <a:schemeClr val="accent1">
+                    <a:lumMod val="60000"/>
+                    <a:lumOff val="40000"/>
+                  </a:schemeClr>
+                </a:solidFill>
+              </a:rPr>
+              <a:t>documentul</a:t>
+            </a:r>
+            <a:r>
+              <a:rPr lang="en-US" b="1" i="1" dirty="0">
+                <a:solidFill>
+                  <a:schemeClr val="accent1">
+                    <a:lumMod val="60000"/>
+                    <a:lumOff val="40000"/>
+                  </a:schemeClr>
+                </a:solidFill>
+              </a:rPr>
+              <a:t> XML</a:t>
+            </a:r>
+            <a:endParaRPr lang="en-US" dirty="0">
+              <a:solidFill>
+                <a:schemeClr val="accent1">
+                  <a:lumMod val="60000"/>
+                  <a:lumOff val="40000"/>
+                </a:schemeClr>
+              </a:solidFill>
+            </a:endParaRPr>
+          </a:p>
+          <a:p>
+            <a:r>
+              <a:rPr lang="en-US" b="1" i="1" dirty="0">
+                <a:solidFill>
+                  <a:schemeClr val="accent1">
+                    <a:lumMod val="60000"/>
+                    <a:lumOff val="40000"/>
+                  </a:schemeClr>
+                </a:solidFill>
+              </a:rPr>
+              <a:t>6.Bibliografie</a:t>
+            </a:r>
+            <a:endParaRPr lang="en-US" dirty="0">
+              <a:solidFill>
+                <a:schemeClr val="accent1">
+                  <a:lumMod val="60000"/>
+                  <a:lumOff val="40000"/>
+                </a:schemeClr>
+              </a:solidFill>
+            </a:endParaRPr>
           </a:p>
         </p:txBody>
       </p:sp>
@@ -4932,6 +5549,13 @@
   <p:clrMapOvr>
     <a:masterClrMapping/>
   </p:clrMapOvr>
+  <p:timing>
+    <p:tnLst>
+      <p:par>
+        <p:cTn id="1" dur="indefinite" restart="never" nodeType="tmRoot"/>
+      </p:par>
+    </p:tnLst>
+  </p:timing>
 </p:sld>
 </file>
 
@@ -4985,7 +5609,7 @@
       </p:sp>
       <p:pic>
         <p:nvPicPr>
-          <p:cNvPr id="1026" name="Picture 2"/>
+          <p:cNvPr id="1027" name="Picture 3"/>
           <p:cNvPicPr>
             <a:picLocks noGrp="1" noChangeAspect="1" noChangeArrowheads="1"/>
           </p:cNvPicPr>
@@ -4994,7 +5618,13 @@
           </p:nvPr>
         </p:nvPicPr>
         <p:blipFill>
-          <a:blip r:embed="rId2"/>
+          <a:blip r:embed="rId2">
+            <a:extLst>
+              <a:ext uri="{28A0092B-C50C-407E-A947-70E740481C1C}">
+                <a14:useLocalDpi xmlns:a14="http://schemas.microsoft.com/office/drawing/2010/main" val="0"/>
+              </a:ext>
+            </a:extLst>
+          </a:blip>
           <a:srcRect/>
           <a:stretch>
             <a:fillRect/>
@@ -5002,20 +5632,45 @@
         </p:blipFill>
         <p:spPr bwMode="auto">
           <a:xfrm>
-            <a:off x="1295400" y="1371600"/>
-            <a:ext cx="7620000" cy="4800600"/>
+            <a:off x="2573281" y="1447800"/>
+            <a:ext cx="5222987" cy="4800600"/>
           </a:xfrm>
           <a:prstGeom prst="rect">
             <a:avLst/>
           </a:prstGeom>
           <a:noFill/>
-          <a:ln w="9525">
+          <a:ln>
             <a:noFill/>
-            <a:miter lim="800000"/>
-            <a:headEnd/>
-            <a:tailEnd/>
           </a:ln>
           <a:effectLst/>
+          <a:extLst>
+            <a:ext uri="{909E8E84-426E-40DD-AFC4-6F175D3DCCD1}">
+              <a14:hiddenFill xmlns:a14="http://schemas.microsoft.com/office/drawing/2010/main">
+                <a:solidFill>
+                  <a:schemeClr val="accent1"/>
+                </a:solidFill>
+              </a14:hiddenFill>
+            </a:ext>
+            <a:ext uri="{91240B29-F687-4F45-9708-019B960494DF}">
+              <a14:hiddenLine xmlns:a14="http://schemas.microsoft.com/office/drawing/2010/main" w="9525">
+                <a:solidFill>
+                  <a:schemeClr val="tx1"/>
+                </a:solidFill>
+                <a:miter lim="800000"/>
+                <a:headEnd/>
+                <a:tailEnd/>
+              </a14:hiddenLine>
+            </a:ext>
+            <a:ext uri="{AF507438-7753-43E0-B8FC-AC1667EBCBE1}">
+              <a14:hiddenEffects xmlns:a14="http://schemas.microsoft.com/office/drawing/2010/main">
+                <a:effectLst>
+                  <a:outerShdw dist="35921" dir="2700000" algn="ctr" rotWithShape="0">
+                    <a:schemeClr val="bg2"/>
+                  </a:outerShdw>
+                </a:effectLst>
+              </a14:hiddenEffects>
+            </a:ext>
+          </a:extLst>
         </p:spPr>
       </p:pic>
     </p:spTree>
@@ -5083,16 +5738,20 @@
       </p:sp>
       <p:pic>
         <p:nvPicPr>
-          <p:cNvPr id="2050" name="Picture 2"/>
+          <p:cNvPr id="4" name="Picture 2"/>
           <p:cNvPicPr>
-            <a:picLocks noGrp="1" noChangeAspect="1" noChangeArrowheads="1"/>
+            <a:picLocks noChangeAspect="1" noChangeArrowheads="1"/>
           </p:cNvPicPr>
-          <p:nvPr>
-            <p:ph idx="1"/>
-          </p:nvPr>
+          <p:nvPr/>
         </p:nvPicPr>
         <p:blipFill>
-          <a:blip r:embed="rId2"/>
+          <a:blip r:embed="rId2">
+            <a:extLst>
+              <a:ext uri="{28A0092B-C50C-407E-A947-70E740481C1C}">
+                <a14:useLocalDpi xmlns:a14="http://schemas.microsoft.com/office/drawing/2010/main" val="0"/>
+              </a:ext>
+            </a:extLst>
+          </a:blip>
           <a:srcRect/>
           <a:stretch>
             <a:fillRect/>
@@ -5100,20 +5759,45 @@
         </p:blipFill>
         <p:spPr bwMode="auto">
           <a:xfrm>
-            <a:off x="1447800" y="1414883"/>
-            <a:ext cx="7423397" cy="4833517"/>
+            <a:off x="1973430" y="1676400"/>
+            <a:ext cx="5229225" cy="3952875"/>
           </a:xfrm>
           <a:prstGeom prst="rect">
             <a:avLst/>
           </a:prstGeom>
           <a:noFill/>
-          <a:ln w="9525">
+          <a:ln>
             <a:noFill/>
-            <a:miter lim="800000"/>
-            <a:headEnd/>
-            <a:tailEnd/>
           </a:ln>
           <a:effectLst/>
+          <a:extLst>
+            <a:ext uri="{909E8E84-426E-40DD-AFC4-6F175D3DCCD1}">
+              <a14:hiddenFill xmlns:a14="http://schemas.microsoft.com/office/drawing/2010/main">
+                <a:solidFill>
+                  <a:schemeClr val="accent1"/>
+                </a:solidFill>
+              </a14:hiddenFill>
+            </a:ext>
+            <a:ext uri="{91240B29-F687-4F45-9708-019B960494DF}">
+              <a14:hiddenLine xmlns:a14="http://schemas.microsoft.com/office/drawing/2010/main" w="9525">
+                <a:solidFill>
+                  <a:schemeClr val="tx1"/>
+                </a:solidFill>
+                <a:miter lim="800000"/>
+                <a:headEnd/>
+                <a:tailEnd/>
+              </a14:hiddenLine>
+            </a:ext>
+            <a:ext uri="{AF507438-7753-43E0-B8FC-AC1667EBCBE1}">
+              <a14:hiddenEffects xmlns:a14="http://schemas.microsoft.com/office/drawing/2010/main">
+                <a:effectLst>
+                  <a:outerShdw dist="35921" dir="2700000" algn="ctr" rotWithShape="0">
+                    <a:schemeClr val="bg2"/>
+                  </a:outerShdw>
+                </a:effectLst>
+              </a14:hiddenEffects>
+            </a:ext>
+          </a:extLst>
         </p:spPr>
       </p:pic>
     </p:spTree>
@@ -5167,11 +5851,7 @@
           <a:p>
             <a:r>
               <a:rPr lang="en-US" dirty="0" smtClean="0"/>
-              <a:t>3. XSD Schema </a:t>
-            </a:r>
-            <a:r>
-              <a:rPr lang="en-US" dirty="0" smtClean="0"/>
-              <a:t>– </a:t>
+              <a:t>3. XSD Schema – </a:t>
             </a:r>
             <a:r>
               <a:rPr lang="en-US" dirty="0" err="1" smtClean="0"/>
@@ -5183,16 +5863,20 @@
       </p:sp>
       <p:pic>
         <p:nvPicPr>
-          <p:cNvPr id="5122" name="Picture 2"/>
+          <p:cNvPr id="3074" name="Picture 2"/>
           <p:cNvPicPr>
-            <a:picLocks noGrp="1" noChangeAspect="1" noChangeArrowheads="1"/>
+            <a:picLocks noChangeAspect="1" noChangeArrowheads="1"/>
           </p:cNvPicPr>
-          <p:nvPr>
-            <p:ph idx="1"/>
-          </p:nvPr>
+          <p:nvPr/>
         </p:nvPicPr>
         <p:blipFill>
-          <a:blip r:embed="rId2"/>
+          <a:blip r:embed="rId2">
+            <a:extLst>
+              <a:ext uri="{28A0092B-C50C-407E-A947-70E740481C1C}">
+                <a14:useLocalDpi xmlns:a14="http://schemas.microsoft.com/office/drawing/2010/main" val="0"/>
+              </a:ext>
+            </a:extLst>
+          </a:blip>
           <a:srcRect/>
           <a:stretch>
             <a:fillRect/>
@@ -5200,20 +5884,45 @@
         </p:blipFill>
         <p:spPr bwMode="auto">
           <a:xfrm>
-            <a:off x="1435100" y="1515698"/>
-            <a:ext cx="7499350" cy="5037501"/>
+            <a:off x="2286000" y="1447800"/>
+            <a:ext cx="4857750" cy="4486275"/>
           </a:xfrm>
           <a:prstGeom prst="rect">
             <a:avLst/>
           </a:prstGeom>
           <a:noFill/>
-          <a:ln w="9525">
+          <a:ln>
             <a:noFill/>
-            <a:miter lim="800000"/>
-            <a:headEnd/>
-            <a:tailEnd/>
           </a:ln>
           <a:effectLst/>
+          <a:extLst>
+            <a:ext uri="{909E8E84-426E-40DD-AFC4-6F175D3DCCD1}">
+              <a14:hiddenFill xmlns:a14="http://schemas.microsoft.com/office/drawing/2010/main">
+                <a:solidFill>
+                  <a:schemeClr val="accent1"/>
+                </a:solidFill>
+              </a14:hiddenFill>
+            </a:ext>
+            <a:ext uri="{91240B29-F687-4F45-9708-019B960494DF}">
+              <a14:hiddenLine xmlns:a14="http://schemas.microsoft.com/office/drawing/2010/main" w="9525">
+                <a:solidFill>
+                  <a:schemeClr val="tx1"/>
+                </a:solidFill>
+                <a:miter lim="800000"/>
+                <a:headEnd/>
+                <a:tailEnd/>
+              </a14:hiddenLine>
+            </a:ext>
+            <a:ext uri="{AF507438-7753-43E0-B8FC-AC1667EBCBE1}">
+              <a14:hiddenEffects xmlns:a14="http://schemas.microsoft.com/office/drawing/2010/main">
+                <a:effectLst>
+                  <a:outerShdw dist="35921" dir="2700000" algn="ctr" rotWithShape="0">
+                    <a:schemeClr val="bg2"/>
+                  </a:outerShdw>
+                </a:effectLst>
+              </a14:hiddenEffects>
+            </a:ext>
+          </a:extLst>
         </p:spPr>
       </p:pic>
     </p:spTree>
@@ -5221,6 +5930,13 @@
   <p:clrMapOvr>
     <a:masterClrMapping/>
   </p:clrMapOvr>
+  <p:timing>
+    <p:tnLst>
+      <p:par>
+        <p:cTn id="1" dur="indefinite" restart="never" nodeType="tmRoot"/>
+      </p:par>
+    </p:tnLst>
+  </p:timing>
 </p:sld>
 </file>
 
@@ -5266,16 +5982,20 @@
       </p:sp>
       <p:pic>
         <p:nvPicPr>
-          <p:cNvPr id="6146" name="Picture 2"/>
+          <p:cNvPr id="4098" name="Picture 2"/>
           <p:cNvPicPr>
-            <a:picLocks noGrp="1" noChangeAspect="1" noChangeArrowheads="1"/>
+            <a:picLocks noChangeAspect="1" noChangeArrowheads="1"/>
           </p:cNvPicPr>
-          <p:nvPr>
-            <p:ph idx="1"/>
-          </p:nvPr>
+          <p:nvPr/>
         </p:nvPicPr>
         <p:blipFill>
-          <a:blip r:embed="rId2"/>
+          <a:blip r:embed="rId2">
+            <a:extLst>
+              <a:ext uri="{28A0092B-C50C-407E-A947-70E740481C1C}">
+                <a14:useLocalDpi xmlns:a14="http://schemas.microsoft.com/office/drawing/2010/main" val="0"/>
+              </a:ext>
+            </a:extLst>
+          </a:blip>
           <a:srcRect/>
           <a:stretch>
             <a:fillRect/>
@@ -5283,20 +6003,45 @@
         </p:blipFill>
         <p:spPr bwMode="auto">
           <a:xfrm>
-            <a:off x="1219200" y="1447800"/>
-            <a:ext cx="7524089" cy="5181600"/>
+            <a:off x="1143000" y="1335004"/>
+            <a:ext cx="7553325" cy="5514975"/>
           </a:xfrm>
           <a:prstGeom prst="rect">
             <a:avLst/>
           </a:prstGeom>
           <a:noFill/>
-          <a:ln w="9525">
+          <a:ln>
             <a:noFill/>
-            <a:miter lim="800000"/>
-            <a:headEnd/>
-            <a:tailEnd/>
           </a:ln>
           <a:effectLst/>
+          <a:extLst>
+            <a:ext uri="{909E8E84-426E-40DD-AFC4-6F175D3DCCD1}">
+              <a14:hiddenFill xmlns:a14="http://schemas.microsoft.com/office/drawing/2010/main">
+                <a:solidFill>
+                  <a:schemeClr val="accent1"/>
+                </a:solidFill>
+              </a14:hiddenFill>
+            </a:ext>
+            <a:ext uri="{91240B29-F687-4F45-9708-019B960494DF}">
+              <a14:hiddenLine xmlns:a14="http://schemas.microsoft.com/office/drawing/2010/main" w="9525">
+                <a:solidFill>
+                  <a:schemeClr val="tx1"/>
+                </a:solidFill>
+                <a:miter lim="800000"/>
+                <a:headEnd/>
+                <a:tailEnd/>
+              </a14:hiddenLine>
+            </a:ext>
+            <a:ext uri="{AF507438-7753-43E0-B8FC-AC1667EBCBE1}">
+              <a14:hiddenEffects xmlns:a14="http://schemas.microsoft.com/office/drawing/2010/main">
+                <a:effectLst>
+                  <a:outerShdw dist="35921" dir="2700000" algn="ctr" rotWithShape="0">
+                    <a:schemeClr val="bg2"/>
+                  </a:outerShdw>
+                </a:effectLst>
+              </a14:hiddenEffects>
+            </a:ext>
+          </a:extLst>
         </p:spPr>
       </p:pic>
     </p:spTree>
@@ -5304,6 +6049,13 @@
   <p:clrMapOvr>
     <a:masterClrMapping/>
   </p:clrMapOvr>
+  <p:timing>
+    <p:tnLst>
+      <p:par>
+        <p:cTn id="1" dur="indefinite" restart="never" nodeType="tmRoot"/>
+      </p:par>
+    </p:tnLst>
+  </p:timing>
 </p:sld>
 </file>
 
@@ -5357,16 +6109,20 @@
       </p:sp>
       <p:pic>
         <p:nvPicPr>
-          <p:cNvPr id="4" name="Content Placeholder 3"/>
+          <p:cNvPr id="5122" name="Picture 2"/>
           <p:cNvPicPr>
-            <a:picLocks noGrp="1"/>
+            <a:picLocks noChangeAspect="1" noChangeArrowheads="1"/>
           </p:cNvPicPr>
-          <p:nvPr>
-            <p:ph idx="1"/>
-          </p:nvPr>
+          <p:nvPr/>
         </p:nvPicPr>
         <p:blipFill>
-          <a:blip r:embed="rId2"/>
+          <a:blip r:embed="rId2">
+            <a:extLst>
+              <a:ext uri="{28A0092B-C50C-407E-A947-70E740481C1C}">
+                <a14:useLocalDpi xmlns:a14="http://schemas.microsoft.com/office/drawing/2010/main" val="0"/>
+              </a:ext>
+            </a:extLst>
+          </a:blip>
           <a:srcRect/>
           <a:stretch>
             <a:fillRect/>
@@ -5374,19 +6130,45 @@
         </p:blipFill>
         <p:spPr bwMode="auto">
           <a:xfrm>
-            <a:off x="1435100" y="1649873"/>
-            <a:ext cx="7499350" cy="4396453"/>
+            <a:off x="1524000" y="1447800"/>
+            <a:ext cx="6629400" cy="4109495"/>
           </a:xfrm>
           <a:prstGeom prst="rect">
             <a:avLst/>
           </a:prstGeom>
           <a:noFill/>
-          <a:ln w="9525">
+          <a:ln>
             <a:noFill/>
-            <a:miter lim="800000"/>
-            <a:headEnd/>
-            <a:tailEnd/>
           </a:ln>
+          <a:effectLst/>
+          <a:extLst>
+            <a:ext uri="{909E8E84-426E-40DD-AFC4-6F175D3DCCD1}">
+              <a14:hiddenFill xmlns:a14="http://schemas.microsoft.com/office/drawing/2010/main">
+                <a:solidFill>
+                  <a:schemeClr val="accent1"/>
+                </a:solidFill>
+              </a14:hiddenFill>
+            </a:ext>
+            <a:ext uri="{91240B29-F687-4F45-9708-019B960494DF}">
+              <a14:hiddenLine xmlns:a14="http://schemas.microsoft.com/office/drawing/2010/main" w="9525">
+                <a:solidFill>
+                  <a:schemeClr val="tx1"/>
+                </a:solidFill>
+                <a:miter lim="800000"/>
+                <a:headEnd/>
+                <a:tailEnd/>
+              </a14:hiddenLine>
+            </a:ext>
+            <a:ext uri="{AF507438-7753-43E0-B8FC-AC1667EBCBE1}">
+              <a14:hiddenEffects xmlns:a14="http://schemas.microsoft.com/office/drawing/2010/main">
+                <a:effectLst>
+                  <a:outerShdw dist="35921" dir="2700000" algn="ctr" rotWithShape="0">
+                    <a:schemeClr val="bg2"/>
+                  </a:outerShdw>
+                </a:effectLst>
+              </a14:hiddenEffects>
+            </a:ext>
+          </a:extLst>
         </p:spPr>
       </p:pic>
     </p:spTree>
@@ -5394,6 +6176,13 @@
   <p:clrMapOvr>
     <a:masterClrMapping/>
   </p:clrMapOvr>
+  <p:timing>
+    <p:tnLst>
+      <p:par>
+        <p:cTn id="1" dur="indefinite" restart="never" nodeType="tmRoot"/>
+      </p:par>
+    </p:tnLst>
+  </p:timing>
 </p:sld>
 </file>
 
@@ -5427,7 +6216,7 @@
         <p:spPr/>
         <p:txBody>
           <a:bodyPr>
-            <a:normAutofit fontScale="90000"/>
+            <a:normAutofit/>
           </a:bodyPr>
           <a:lstStyle/>
           <a:p>
@@ -5445,7 +6234,7 @@
             </a:r>
             <a:r>
               <a:rPr lang="en-US" dirty="0" err="1" smtClean="0"/>
-              <a:t>Adaugare</a:t>
+              <a:t>Vizualizare</a:t>
             </a:r>
             <a:r>
               <a:rPr lang="en-US" dirty="0" smtClean="0"/>
@@ -5453,7 +6242,7 @@
             </a:r>
             <a:r>
               <a:rPr lang="en-US" dirty="0" err="1" smtClean="0"/>
-              <a:t>rezervare</a:t>
+              <a:t>detalii</a:t>
             </a:r>
             <a:endParaRPr lang="en-US" dirty="0"/>
           </a:p>
@@ -5461,16 +6250,20 @@
       </p:sp>
       <p:pic>
         <p:nvPicPr>
-          <p:cNvPr id="4" name="Content Placeholder 3"/>
+          <p:cNvPr id="6146" name="Picture 2"/>
           <p:cNvPicPr>
-            <a:picLocks noGrp="1"/>
+            <a:picLocks noChangeAspect="1" noChangeArrowheads="1"/>
           </p:cNvPicPr>
-          <p:nvPr>
-            <p:ph idx="1"/>
-          </p:nvPr>
+          <p:nvPr/>
         </p:nvPicPr>
         <p:blipFill>
-          <a:blip r:embed="rId2"/>
+          <a:blip r:embed="rId2">
+            <a:extLst>
+              <a:ext uri="{28A0092B-C50C-407E-A947-70E740481C1C}">
+                <a14:useLocalDpi xmlns:a14="http://schemas.microsoft.com/office/drawing/2010/main" val="0"/>
+              </a:ext>
+            </a:extLst>
+          </a:blip>
           <a:srcRect/>
           <a:stretch>
             <a:fillRect/>
@@ -5478,19 +6271,45 @@
         </p:blipFill>
         <p:spPr bwMode="auto">
           <a:xfrm>
-            <a:off x="1219200" y="1447800"/>
-            <a:ext cx="7543800" cy="5181600"/>
+            <a:off x="1219200" y="1600200"/>
+            <a:ext cx="7766981" cy="4500563"/>
           </a:xfrm>
           <a:prstGeom prst="rect">
             <a:avLst/>
           </a:prstGeom>
           <a:noFill/>
-          <a:ln w="9525">
+          <a:ln>
             <a:noFill/>
-            <a:miter lim="800000"/>
-            <a:headEnd/>
-            <a:tailEnd/>
           </a:ln>
+          <a:effectLst/>
+          <a:extLst>
+            <a:ext uri="{909E8E84-426E-40DD-AFC4-6F175D3DCCD1}">
+              <a14:hiddenFill xmlns:a14="http://schemas.microsoft.com/office/drawing/2010/main">
+                <a:solidFill>
+                  <a:schemeClr val="accent1"/>
+                </a:solidFill>
+              </a14:hiddenFill>
+            </a:ext>
+            <a:ext uri="{91240B29-F687-4F45-9708-019B960494DF}">
+              <a14:hiddenLine xmlns:a14="http://schemas.microsoft.com/office/drawing/2010/main" w="9525">
+                <a:solidFill>
+                  <a:schemeClr val="tx1"/>
+                </a:solidFill>
+                <a:miter lim="800000"/>
+                <a:headEnd/>
+                <a:tailEnd/>
+              </a14:hiddenLine>
+            </a:ext>
+            <a:ext uri="{AF507438-7753-43E0-B8FC-AC1667EBCBE1}">
+              <a14:hiddenEffects xmlns:a14="http://schemas.microsoft.com/office/drawing/2010/main">
+                <a:effectLst>
+                  <a:outerShdw dist="35921" dir="2700000" algn="ctr" rotWithShape="0">
+                    <a:schemeClr val="bg2"/>
+                  </a:outerShdw>
+                </a:effectLst>
+              </a14:hiddenEffects>
+            </a:ext>
+          </a:extLst>
         </p:spPr>
       </p:pic>
     </p:spTree>
@@ -5498,6 +6317,13 @@
   <p:clrMapOvr>
     <a:masterClrMapping/>
   </p:clrMapOvr>
+  <p:timing>
+    <p:tnLst>
+      <p:par>
+        <p:cTn id="1" dur="indefinite" restart="never" nodeType="tmRoot"/>
+      </p:par>
+    </p:tnLst>
+  </p:timing>
 </p:sld>
 </file>
 
@@ -5551,7 +6377,11 @@
             </a:r>
             <a:r>
               <a:rPr lang="en-US" dirty="0" smtClean="0"/>
-              <a:t> ca XSL</a:t>
+              <a:t> </a:t>
+            </a:r>
+            <a:r>
+              <a:rPr lang="en-US" dirty="0" smtClean="0"/>
+              <a:t>ASG</a:t>
             </a:r>
             <a:endParaRPr lang="en-US" dirty="0"/>
           </a:p>
@@ -5559,16 +6389,20 @@
       </p:sp>
       <p:pic>
         <p:nvPicPr>
-          <p:cNvPr id="4" name="Content Placeholder 3"/>
+          <p:cNvPr id="7170" name="Picture 2"/>
           <p:cNvPicPr>
-            <a:picLocks noGrp="1"/>
+            <a:picLocks noChangeAspect="1" noChangeArrowheads="1"/>
           </p:cNvPicPr>
-          <p:nvPr>
-            <p:ph idx="1"/>
-          </p:nvPr>
+          <p:nvPr/>
         </p:nvPicPr>
         <p:blipFill>
-          <a:blip r:embed="rId2"/>
+          <a:blip r:embed="rId2">
+            <a:extLst>
+              <a:ext uri="{28A0092B-C50C-407E-A947-70E740481C1C}">
+                <a14:useLocalDpi xmlns:a14="http://schemas.microsoft.com/office/drawing/2010/main" val="0"/>
+              </a:ext>
+            </a:extLst>
+          </a:blip>
           <a:srcRect/>
           <a:stretch>
             <a:fillRect/>
@@ -5576,19 +6410,45 @@
         </p:blipFill>
         <p:spPr bwMode="auto">
           <a:xfrm>
-            <a:off x="1676400" y="1371600"/>
-            <a:ext cx="7010399" cy="5029200"/>
+            <a:off x="1371600" y="1447800"/>
+            <a:ext cx="7315200" cy="4467225"/>
           </a:xfrm>
           <a:prstGeom prst="rect">
             <a:avLst/>
           </a:prstGeom>
           <a:noFill/>
-          <a:ln w="9525">
+          <a:ln>
             <a:noFill/>
-            <a:miter lim="800000"/>
-            <a:headEnd/>
-            <a:tailEnd/>
           </a:ln>
+          <a:effectLst/>
+          <a:extLst>
+            <a:ext uri="{909E8E84-426E-40DD-AFC4-6F175D3DCCD1}">
+              <a14:hiddenFill xmlns:a14="http://schemas.microsoft.com/office/drawing/2010/main">
+                <a:solidFill>
+                  <a:schemeClr val="accent1"/>
+                </a:solidFill>
+              </a14:hiddenFill>
+            </a:ext>
+            <a:ext uri="{91240B29-F687-4F45-9708-019B960494DF}">
+              <a14:hiddenLine xmlns:a14="http://schemas.microsoft.com/office/drawing/2010/main" w="9525">
+                <a:solidFill>
+                  <a:schemeClr val="tx1"/>
+                </a:solidFill>
+                <a:miter lim="800000"/>
+                <a:headEnd/>
+                <a:tailEnd/>
+              </a14:hiddenLine>
+            </a:ext>
+            <a:ext uri="{AF507438-7753-43E0-B8FC-AC1667EBCBE1}">
+              <a14:hiddenEffects xmlns:a14="http://schemas.microsoft.com/office/drawing/2010/main">
+                <a:effectLst>
+                  <a:outerShdw dist="35921" dir="2700000" algn="ctr" rotWithShape="0">
+                    <a:schemeClr val="bg2"/>
+                  </a:outerShdw>
+                </a:effectLst>
+              </a14:hiddenEffects>
+            </a:ext>
+          </a:extLst>
         </p:spPr>
       </p:pic>
     </p:spTree>
@@ -5596,6 +6456,13 @@
   <p:clrMapOvr>
     <a:masterClrMapping/>
   </p:clrMapOvr>
+  <p:timing>
+    <p:tnLst>
+      <p:par>
+        <p:cTn id="1" dur="indefinite" restart="never" nodeType="tmRoot"/>
+      </p:par>
+    </p:tnLst>
+  </p:timing>
 </p:sld>
 </file>
 

</xml_diff>